<commit_message>
atualização da apresentação para o IEEE COG.
</commit_message>
<xml_diff>
--- a/IEEE COG Presentation.pptx
+++ b/IEEE COG Presentation.pptx
@@ -206,7 +206,7 @@
           <a:p>
             <a:fld id="{9788BEF5-D634-4783-BB1D-B313F140711D}" type="datetimeFigureOut">
               <a:rPr lang="pt-BR" smtClean="0"/>
-              <a:t>11/08/2021</a:t>
+              <a:t>16/08/2021</a:t>
             </a:fld>
             <a:endParaRPr lang="pt-BR"/>
           </a:p>
@@ -970,7 +970,7 @@
           <a:p>
             <a:fld id="{03256F8D-B97E-43C1-A362-ACCCB0902852}" type="datetime1">
               <a:rPr lang="pt-BR" smtClean="0"/>
-              <a:t>11/08/2021</a:t>
+              <a:t>16/08/2021</a:t>
             </a:fld>
             <a:endParaRPr lang="pt-BR" dirty="0"/>
           </a:p>
@@ -1303,7 +1303,7 @@
           <a:p>
             <a:fld id="{527616B3-5C92-49D6-B64F-E0CE165CAC41}" type="datetime1">
               <a:rPr lang="pt-BR" smtClean="0"/>
-              <a:t>11/08/2021</a:t>
+              <a:t>16/08/2021</a:t>
             </a:fld>
             <a:endParaRPr lang="pt-BR">
               <a:latin typeface="Fira Sans" panose="020B0503050000020004" pitchFamily="34" charset="0"/>
@@ -1626,7 +1626,7 @@
           <a:p>
             <a:fld id="{527616B3-5C92-49D6-B64F-E0CE165CAC41}" type="datetime1">
               <a:rPr lang="pt-BR" smtClean="0"/>
-              <a:t>11/08/2021</a:t>
+              <a:t>16/08/2021</a:t>
             </a:fld>
             <a:endParaRPr lang="pt-BR">
               <a:latin typeface="Fira Sans" panose="020B0503050000020004" pitchFamily="34" charset="0"/>
@@ -2135,7 +2135,7 @@
           <a:p>
             <a:fld id="{527616B3-5C92-49D6-B64F-E0CE165CAC41}" type="datetime1">
               <a:rPr lang="pt-BR" smtClean="0"/>
-              <a:t>11/08/2021</a:t>
+              <a:t>16/08/2021</a:t>
             </a:fld>
             <a:endParaRPr lang="pt-BR">
               <a:latin typeface="Fira Sans" panose="020B0503050000020004" pitchFamily="34" charset="0"/>
@@ -2296,7 +2296,7 @@
           <a:p>
             <a:fld id="{34DF4699-49A3-4FAC-9074-EE48978C0213}" type="datetime1">
               <a:rPr lang="pt-BR" smtClean="0"/>
-              <a:t>11/08/2021</a:t>
+              <a:t>16/08/2021</a:t>
             </a:fld>
             <a:endParaRPr lang="pt-BR"/>
           </a:p>
@@ -2413,7 +2413,7 @@
           <a:p>
             <a:fld id="{527616B3-5C92-49D6-B64F-E0CE165CAC41}" type="datetime1">
               <a:rPr lang="pt-BR" smtClean="0"/>
-              <a:t>11/08/2021</a:t>
+              <a:t>16/08/2021</a:t>
             </a:fld>
             <a:endParaRPr lang="pt-BR">
               <a:latin typeface="Fira Sans" panose="020B0503050000020004" pitchFamily="34" charset="0"/>
@@ -2810,7 +2810,7 @@
           <a:p>
             <a:fld id="{527616B3-5C92-49D6-B64F-E0CE165CAC41}" type="datetime1">
               <a:rPr lang="pt-BR" smtClean="0"/>
-              <a:t>11/08/2021</a:t>
+              <a:t>16/08/2021</a:t>
             </a:fld>
             <a:endParaRPr lang="pt-BR">
               <a:latin typeface="Fira Sans" panose="020B0503050000020004" pitchFamily="34" charset="0"/>
@@ -3559,7 +3559,7 @@
             <a:fld id="{8EFE941A-E170-432C-9C6F-1589B8418E42}" type="datetime1">
               <a:rPr lang="pt-BR" smtClean="0"/>
               <a:pPr/>
-              <a:t>11/08/2021</a:t>
+              <a:t>16/08/2021</a:t>
             </a:fld>
             <a:endParaRPr lang="pt-BR" dirty="0"/>
           </a:p>
@@ -3710,8 +3710,8 @@
         </p:blipFill>
         <p:spPr>
           <a:xfrm>
-            <a:off x="1951038" y="1198562"/>
-            <a:ext cx="8324850" cy="4676775"/>
+            <a:off x="5832791" y="1676993"/>
+            <a:ext cx="6237288" cy="3504014"/>
           </a:xfrm>
           <a:prstGeom prst="rect">
             <a:avLst/>
@@ -3830,7 +3830,7 @@
             <a:fld id="{8EFE941A-E170-432C-9C6F-1589B8418E42}" type="datetime1">
               <a:rPr lang="pt-BR" smtClean="0"/>
               <a:pPr/>
-              <a:t>11/08/2021</a:t>
+              <a:t>16/08/2021</a:t>
             </a:fld>
             <a:endParaRPr lang="pt-BR" dirty="0"/>
           </a:p>
@@ -4035,7 +4035,7 @@
             <a:fld id="{8EFE941A-E170-432C-9C6F-1589B8418E42}" type="datetime1">
               <a:rPr lang="pt-BR" smtClean="0"/>
               <a:pPr/>
-              <a:t>11/08/2021</a:t>
+              <a:t>16/08/2021</a:t>
             </a:fld>
             <a:endParaRPr lang="pt-BR" dirty="0"/>
           </a:p>
@@ -4271,7 +4271,7 @@
             <a:fld id="{8EFE941A-E170-432C-9C6F-1589B8418E42}" type="datetime1">
               <a:rPr lang="pt-BR" smtClean="0"/>
               <a:pPr/>
-              <a:t>11/08/2021</a:t>
+              <a:t>16/08/2021</a:t>
             </a:fld>
             <a:endParaRPr lang="pt-BR" dirty="0"/>
           </a:p>
@@ -5025,7 +5025,7 @@
             <a:fld id="{8EFE941A-E170-432C-9C6F-1589B8418E42}" type="datetime1">
               <a:rPr lang="pt-BR" smtClean="0"/>
               <a:pPr/>
-              <a:t>11/08/2021</a:t>
+              <a:t>16/08/2021</a:t>
             </a:fld>
             <a:endParaRPr lang="pt-BR" dirty="0"/>
           </a:p>
@@ -5410,7 +5410,7 @@
             <a:fld id="{8EFE941A-E170-432C-9C6F-1589B8418E42}" type="datetime1">
               <a:rPr lang="pt-BR" smtClean="0"/>
               <a:pPr/>
-              <a:t>11/08/2021</a:t>
+              <a:t>16/08/2021</a:t>
             </a:fld>
             <a:endParaRPr lang="pt-BR" dirty="0"/>
           </a:p>
@@ -5701,7 +5701,7 @@
             <a:fld id="{8EFE941A-E170-432C-9C6F-1589B8418E42}" type="datetime1">
               <a:rPr lang="pt-BR" smtClean="0"/>
               <a:pPr/>
-              <a:t>11/08/2021</a:t>
+              <a:t>16/08/2021</a:t>
             </a:fld>
             <a:endParaRPr lang="pt-BR" dirty="0"/>
           </a:p>
@@ -5904,7 +5904,7 @@
             <a:fld id="{8EFE941A-E170-432C-9C6F-1589B8418E42}" type="datetime1">
               <a:rPr lang="pt-BR" smtClean="0"/>
               <a:pPr/>
-              <a:t>11/08/2021</a:t>
+              <a:t>16/08/2021</a:t>
             </a:fld>
             <a:endParaRPr lang="pt-BR" dirty="0"/>
           </a:p>

</xml_diff>

<commit_message>
feat: atualização da apresentação do IEEE COG.
</commit_message>
<xml_diff>
--- a/IEEE COG Presentation.pptx
+++ b/IEEE COG Presentation.pptx
@@ -206,7 +206,7 @@
           <a:p>
             <a:fld id="{9788BEF5-D634-4783-BB1D-B313F140711D}" type="datetimeFigureOut">
               <a:rPr lang="pt-BR" smtClean="0"/>
-              <a:t>16/08/2021</a:t>
+              <a:t>18/08/2021</a:t>
             </a:fld>
             <a:endParaRPr lang="pt-BR"/>
           </a:p>
@@ -519,9 +519,520 @@
           <a:lstStyle/>
           <a:p>
             <a:r>
-              <a:rPr lang="pt-BR" dirty="0"/>
-              <a:t>Falar que predições e palpites são antigos e realizados frequentemente</a:t>
-            </a:r>
+              <a:rPr lang="pt-BR" dirty="0" err="1"/>
+              <a:t>Good</a:t>
+            </a:r>
+            <a:r>
+              <a:rPr lang="pt-BR" dirty="0"/>
+              <a:t> </a:t>
+            </a:r>
+            <a:r>
+              <a:rPr lang="pt-BR" dirty="0" err="1"/>
+              <a:t>morning</a:t>
+            </a:r>
+            <a:r>
+              <a:rPr lang="pt-BR" dirty="0"/>
+              <a:t> </a:t>
+            </a:r>
+            <a:r>
+              <a:rPr lang="pt-BR" dirty="0" err="1"/>
+              <a:t>everyone</a:t>
+            </a:r>
+            <a:r>
+              <a:rPr lang="pt-BR" dirty="0"/>
+              <a:t>, it </a:t>
+            </a:r>
+            <a:r>
+              <a:rPr lang="pt-BR" dirty="0" err="1"/>
+              <a:t>is</a:t>
+            </a:r>
+            <a:r>
+              <a:rPr lang="pt-BR" dirty="0"/>
+              <a:t> a </a:t>
+            </a:r>
+            <a:r>
+              <a:rPr lang="pt-BR" dirty="0" err="1"/>
+              <a:t>pleasure</a:t>
+            </a:r>
+            <a:r>
+              <a:rPr lang="pt-BR" dirty="0"/>
+              <a:t> </a:t>
+            </a:r>
+            <a:r>
+              <a:rPr lang="pt-BR" dirty="0" err="1"/>
+              <a:t>to</a:t>
+            </a:r>
+            <a:r>
+              <a:rPr lang="pt-BR" dirty="0"/>
+              <a:t> </a:t>
+            </a:r>
+            <a:r>
+              <a:rPr lang="pt-BR" dirty="0" err="1"/>
+              <a:t>be</a:t>
+            </a:r>
+            <a:r>
+              <a:rPr lang="pt-BR" dirty="0"/>
+              <a:t> </a:t>
+            </a:r>
+            <a:r>
+              <a:rPr lang="pt-BR" dirty="0" err="1"/>
+              <a:t>here</a:t>
+            </a:r>
+            <a:r>
+              <a:rPr lang="pt-BR" dirty="0"/>
+              <a:t> </a:t>
+            </a:r>
+            <a:r>
+              <a:rPr lang="pt-BR" dirty="0" err="1"/>
+              <a:t>today</a:t>
+            </a:r>
+            <a:r>
+              <a:rPr lang="pt-BR" dirty="0"/>
+              <a:t>. </a:t>
+            </a:r>
+            <a:r>
+              <a:rPr lang="pt-BR" dirty="0" err="1"/>
+              <a:t>My</a:t>
+            </a:r>
+            <a:r>
+              <a:rPr lang="pt-BR" dirty="0"/>
+              <a:t> </a:t>
+            </a:r>
+            <a:r>
+              <a:rPr lang="pt-BR" dirty="0" err="1"/>
+              <a:t>name</a:t>
+            </a:r>
+            <a:r>
+              <a:rPr lang="pt-BR" dirty="0"/>
+              <a:t> </a:t>
+            </a:r>
+            <a:r>
+              <a:rPr lang="pt-BR" dirty="0" err="1"/>
+              <a:t>is</a:t>
+            </a:r>
+            <a:r>
+              <a:rPr lang="pt-BR" dirty="0"/>
+              <a:t> Lincoln </a:t>
+            </a:r>
+            <a:r>
+              <a:rPr lang="pt-BR" dirty="0" err="1"/>
+              <a:t>and</a:t>
+            </a:r>
+            <a:r>
+              <a:rPr lang="pt-BR" dirty="0"/>
+              <a:t> </a:t>
+            </a:r>
+            <a:r>
+              <a:rPr lang="pt-BR" dirty="0" err="1"/>
+              <a:t>my</a:t>
+            </a:r>
+            <a:r>
+              <a:rPr lang="pt-BR" dirty="0"/>
+              <a:t> </a:t>
+            </a:r>
+            <a:r>
+              <a:rPr lang="pt-BR" dirty="0" err="1"/>
+              <a:t>here</a:t>
+            </a:r>
+            <a:r>
+              <a:rPr lang="pt-BR" dirty="0"/>
+              <a:t> </a:t>
+            </a:r>
+            <a:r>
+              <a:rPr lang="pt-BR" dirty="0" err="1"/>
+              <a:t>to</a:t>
+            </a:r>
+            <a:r>
+              <a:rPr lang="pt-BR" dirty="0"/>
+              <a:t> </a:t>
+            </a:r>
+            <a:r>
+              <a:rPr lang="pt-BR" dirty="0" err="1"/>
+              <a:t>present</a:t>
+            </a:r>
+            <a:r>
+              <a:rPr lang="pt-BR" dirty="0"/>
+              <a:t> </a:t>
+            </a:r>
+            <a:r>
+              <a:rPr lang="pt-BR" dirty="0" err="1"/>
+              <a:t>my</a:t>
+            </a:r>
+            <a:r>
+              <a:rPr lang="pt-BR" dirty="0"/>
+              <a:t> </a:t>
+            </a:r>
+            <a:r>
+              <a:rPr lang="pt-BR" dirty="0" err="1"/>
+              <a:t>research</a:t>
+            </a:r>
+            <a:r>
+              <a:rPr lang="pt-BR" dirty="0"/>
+              <a:t> </a:t>
+            </a:r>
+            <a:r>
+              <a:rPr lang="pt-BR" dirty="0" err="1"/>
+              <a:t>entitled</a:t>
+            </a:r>
+            <a:r>
+              <a:rPr lang="pt-BR" dirty="0"/>
+              <a:t> </a:t>
+            </a:r>
+            <a:r>
+              <a:rPr lang="pt-BR" dirty="0" err="1"/>
+              <a:t>Feature</a:t>
+            </a:r>
+            <a:r>
+              <a:rPr lang="pt-BR" dirty="0"/>
+              <a:t> </a:t>
+            </a:r>
+            <a:r>
+              <a:rPr lang="pt-BR" dirty="0" err="1"/>
+              <a:t>Analysis</a:t>
+            </a:r>
+            <a:r>
+              <a:rPr lang="pt-BR" dirty="0"/>
+              <a:t> </a:t>
+            </a:r>
+            <a:r>
+              <a:rPr lang="pt-BR" dirty="0" err="1"/>
+              <a:t>to</a:t>
+            </a:r>
+            <a:r>
+              <a:rPr lang="pt-BR" dirty="0"/>
+              <a:t> League </a:t>
+            </a:r>
+            <a:r>
+              <a:rPr lang="pt-BR" dirty="0" err="1"/>
+              <a:t>of</a:t>
+            </a:r>
+            <a:r>
+              <a:rPr lang="pt-BR" dirty="0"/>
+              <a:t> </a:t>
+            </a:r>
+            <a:r>
+              <a:rPr lang="pt-BR" dirty="0" err="1"/>
+              <a:t>Legends</a:t>
+            </a:r>
+            <a:r>
+              <a:rPr lang="pt-BR" dirty="0"/>
+              <a:t> </a:t>
+            </a:r>
+            <a:r>
+              <a:rPr lang="pt-BR" dirty="0" err="1"/>
+              <a:t>Victory</a:t>
+            </a:r>
+            <a:r>
+              <a:rPr lang="pt-BR" dirty="0"/>
+              <a:t> </a:t>
+            </a:r>
+            <a:r>
+              <a:rPr lang="pt-BR" dirty="0" err="1"/>
+              <a:t>Prediction</a:t>
+            </a:r>
+            <a:r>
+              <a:rPr lang="pt-BR" dirty="0"/>
+              <a:t> </a:t>
+            </a:r>
+            <a:r>
+              <a:rPr lang="pt-BR" dirty="0" err="1"/>
+              <a:t>on</a:t>
+            </a:r>
+            <a:r>
+              <a:rPr lang="pt-BR" dirty="0"/>
+              <a:t> </a:t>
+            </a:r>
+            <a:r>
+              <a:rPr lang="pt-BR" dirty="0" err="1"/>
+              <a:t>the</a:t>
+            </a:r>
+            <a:r>
+              <a:rPr lang="pt-BR" dirty="0"/>
+              <a:t> </a:t>
+            </a:r>
+            <a:r>
+              <a:rPr lang="pt-BR" dirty="0" err="1"/>
+              <a:t>Picks</a:t>
+            </a:r>
+            <a:r>
+              <a:rPr lang="pt-BR" dirty="0"/>
+              <a:t> </a:t>
+            </a:r>
+            <a:r>
+              <a:rPr lang="pt-BR" dirty="0" err="1"/>
+              <a:t>and</a:t>
+            </a:r>
+            <a:r>
+              <a:rPr lang="pt-BR" dirty="0"/>
+              <a:t> </a:t>
+            </a:r>
+            <a:r>
+              <a:rPr lang="pt-BR" dirty="0" err="1"/>
+              <a:t>Bans</a:t>
+            </a:r>
+            <a:r>
+              <a:rPr lang="pt-BR" dirty="0"/>
+              <a:t> </a:t>
+            </a:r>
+            <a:r>
+              <a:rPr lang="pt-BR" dirty="0" err="1"/>
+              <a:t>Phase</a:t>
+            </a:r>
+            <a:r>
+              <a:rPr lang="pt-BR" dirty="0"/>
+              <a:t>. Rafael, Francisco </a:t>
+            </a:r>
+            <a:r>
+              <a:rPr lang="pt-BR" dirty="0" err="1"/>
+              <a:t>and</a:t>
+            </a:r>
+            <a:r>
+              <a:rPr lang="pt-BR" dirty="0"/>
+              <a:t> Geraldo </a:t>
+            </a:r>
+            <a:r>
+              <a:rPr lang="pt-BR" dirty="0" err="1"/>
+              <a:t>also</a:t>
+            </a:r>
+            <a:r>
+              <a:rPr lang="pt-BR" dirty="0"/>
+              <a:t> </a:t>
+            </a:r>
+            <a:r>
+              <a:rPr lang="pt-BR" dirty="0" err="1"/>
+              <a:t>worked</a:t>
+            </a:r>
+            <a:r>
+              <a:rPr lang="pt-BR" dirty="0"/>
+              <a:t> </a:t>
+            </a:r>
+            <a:r>
+              <a:rPr lang="pt-BR" dirty="0" err="1"/>
+              <a:t>with</a:t>
+            </a:r>
+            <a:r>
+              <a:rPr lang="pt-BR" dirty="0"/>
+              <a:t> me in </a:t>
+            </a:r>
+            <a:r>
+              <a:rPr lang="pt-BR" dirty="0" err="1"/>
+              <a:t>this</a:t>
+            </a:r>
+            <a:r>
+              <a:rPr lang="pt-BR" dirty="0"/>
+              <a:t> </a:t>
+            </a:r>
+            <a:r>
+              <a:rPr lang="pt-BR" dirty="0" err="1"/>
+              <a:t>paper</a:t>
+            </a:r>
+            <a:r>
+              <a:rPr lang="pt-BR" dirty="0"/>
+              <a:t>.</a:t>
+            </a:r>
+          </a:p>
+        </p:txBody>
+      </p:sp>
+      <p:sp>
+        <p:nvSpPr>
+          <p:cNvPr id="4" name="Espaço Reservado para Número de Slide 3"/>
+          <p:cNvSpPr>
+            <a:spLocks noGrp="1"/>
+          </p:cNvSpPr>
+          <p:nvPr>
+            <p:ph type="sldNum" sz="quarter" idx="5"/>
+          </p:nvPr>
+        </p:nvSpPr>
+        <p:spPr/>
+        <p:txBody>
+          <a:bodyPr/>
+          <a:lstStyle/>
+          <a:p>
+            <a:fld id="{89E425CA-8A3B-4084-BB85-5B9C87A99CAF}" type="slidenum">
+              <a:rPr lang="pt-BR" smtClean="0"/>
+              <a:t>1</a:t>
+            </a:fld>
+            <a:endParaRPr lang="pt-BR"/>
+          </a:p>
+        </p:txBody>
+      </p:sp>
+    </p:spTree>
+    <p:extLst>
+      <p:ext uri="{BB962C8B-B14F-4D97-AF65-F5344CB8AC3E}">
+        <p14:creationId xmlns:p14="http://schemas.microsoft.com/office/powerpoint/2010/main" val="230561855"/>
+      </p:ext>
+    </p:extLst>
+  </p:cSld>
+  <p:clrMapOvr>
+    <a:masterClrMapping/>
+  </p:clrMapOvr>
+</p:notes>
+</file>
+
+<file path=ppt/notesSlides/notesSlide10.xml><?xml version="1.0" encoding="utf-8"?>
+<p:notes xmlns:a="http://schemas.openxmlformats.org/drawingml/2006/main" xmlns:r="http://schemas.openxmlformats.org/officeDocument/2006/relationships" xmlns:p="http://schemas.openxmlformats.org/presentationml/2006/main">
+  <p:cSld>
+    <p:spTree>
+      <p:nvGrpSpPr>
+        <p:cNvPr id="1" name=""/>
+        <p:cNvGrpSpPr/>
+        <p:nvPr/>
+      </p:nvGrpSpPr>
+      <p:grpSpPr>
+        <a:xfrm>
+          <a:off x="0" y="0"/>
+          <a:ext cx="0" cy="0"/>
+          <a:chOff x="0" y="0"/>
+          <a:chExt cx="0" cy="0"/>
+        </a:xfrm>
+      </p:grpSpPr>
+      <p:sp>
+        <p:nvSpPr>
+          <p:cNvPr id="2" name="Espaço Reservado para Imagem de Slide 1"/>
+          <p:cNvSpPr>
+            <a:spLocks noGrp="1" noRot="1" noChangeAspect="1"/>
+          </p:cNvSpPr>
+          <p:nvPr>
+            <p:ph type="sldImg"/>
+          </p:nvPr>
+        </p:nvSpPr>
+        <p:spPr/>
+      </p:sp>
+      <p:sp>
+        <p:nvSpPr>
+          <p:cNvPr id="3" name="Espaço Reservado para Anotações 2"/>
+          <p:cNvSpPr>
+            <a:spLocks noGrp="1"/>
+          </p:cNvSpPr>
+          <p:nvPr>
+            <p:ph type="body" idx="1"/>
+          </p:nvPr>
+        </p:nvSpPr>
+        <p:spPr/>
+        <p:txBody>
+          <a:bodyPr/>
+          <a:lstStyle/>
+          <a:p>
+            <a:r>
+              <a:rPr lang="pt-BR" dirty="0" err="1"/>
+              <a:t>Thanks</a:t>
+            </a:r>
+            <a:r>
+              <a:rPr lang="pt-BR" dirty="0"/>
+              <a:t> for </a:t>
+            </a:r>
+            <a:r>
+              <a:rPr lang="pt-BR" dirty="0" err="1"/>
+              <a:t>the</a:t>
+            </a:r>
+            <a:r>
+              <a:rPr lang="pt-BR" dirty="0"/>
+              <a:t> </a:t>
+            </a:r>
+            <a:r>
+              <a:rPr lang="pt-BR" dirty="0" err="1"/>
+              <a:t>attention</a:t>
+            </a:r>
+            <a:r>
+              <a:rPr lang="pt-BR" dirty="0"/>
+              <a:t>!</a:t>
+            </a:r>
+          </a:p>
+        </p:txBody>
+      </p:sp>
+      <p:sp>
+        <p:nvSpPr>
+          <p:cNvPr id="4" name="Espaço Reservado para Número de Slide 3"/>
+          <p:cNvSpPr>
+            <a:spLocks noGrp="1"/>
+          </p:cNvSpPr>
+          <p:nvPr>
+            <p:ph type="sldNum" sz="quarter" idx="5"/>
+          </p:nvPr>
+        </p:nvSpPr>
+        <p:spPr/>
+        <p:txBody>
+          <a:bodyPr/>
+          <a:lstStyle/>
+          <a:p>
+            <a:fld id="{89E425CA-8A3B-4084-BB85-5B9C87A99CAF}" type="slidenum">
+              <a:rPr lang="pt-BR" smtClean="0"/>
+              <a:t>10</a:t>
+            </a:fld>
+            <a:endParaRPr lang="pt-BR"/>
+          </a:p>
+        </p:txBody>
+      </p:sp>
+    </p:spTree>
+    <p:extLst>
+      <p:ext uri="{BB962C8B-B14F-4D97-AF65-F5344CB8AC3E}">
+        <p14:creationId xmlns:p14="http://schemas.microsoft.com/office/powerpoint/2010/main" val="1594212334"/>
+      </p:ext>
+    </p:extLst>
+  </p:cSld>
+  <p:clrMapOvr>
+    <a:masterClrMapping/>
+  </p:clrMapOvr>
+</p:notes>
+</file>
+
+<file path=ppt/notesSlides/notesSlide2.xml><?xml version="1.0" encoding="utf-8"?>
+<p:notes xmlns:a="http://schemas.openxmlformats.org/drawingml/2006/main" xmlns:r="http://schemas.openxmlformats.org/officeDocument/2006/relationships" xmlns:p="http://schemas.openxmlformats.org/presentationml/2006/main">
+  <p:cSld>
+    <p:spTree>
+      <p:nvGrpSpPr>
+        <p:cNvPr id="1" name=""/>
+        <p:cNvGrpSpPr/>
+        <p:nvPr/>
+      </p:nvGrpSpPr>
+      <p:grpSpPr>
+        <a:xfrm>
+          <a:off x="0" y="0"/>
+          <a:ext cx="0" cy="0"/>
+          <a:chOff x="0" y="0"/>
+          <a:chExt cx="0" cy="0"/>
+        </a:xfrm>
+      </p:grpSpPr>
+      <p:sp>
+        <p:nvSpPr>
+          <p:cNvPr id="2" name="Espaço Reservado para Imagem de Slide 1"/>
+          <p:cNvSpPr>
+            <a:spLocks noGrp="1" noRot="1" noChangeAspect="1"/>
+          </p:cNvSpPr>
+          <p:nvPr>
+            <p:ph type="sldImg"/>
+          </p:nvPr>
+        </p:nvSpPr>
+        <p:spPr/>
+      </p:sp>
+      <p:sp>
+        <p:nvSpPr>
+          <p:cNvPr id="3" name="Espaço Reservado para Anotações 2"/>
+          <p:cNvSpPr>
+            <a:spLocks noGrp="1"/>
+          </p:cNvSpPr>
+          <p:nvPr>
+            <p:ph type="body" idx="1"/>
+          </p:nvPr>
+        </p:nvSpPr>
+        <p:spPr/>
+        <p:txBody>
+          <a:bodyPr/>
+          <a:lstStyle/>
+          <a:p>
+            <a:r>
+              <a:rPr lang="en-US" dirty="0"/>
+              <a:t>Predictions and guesses are often performed in various traditional and electronic sports. They happen between casters, fans, and even artificial intelligence models. Here we have two images representing guesses and predictions made during the 2020 League of Legends World Championship. They presents predictions made by Riot Games’ casters, </a:t>
+            </a:r>
+            <a:r>
+              <a:rPr lang="en-US" dirty="0" err="1"/>
+              <a:t>LoL</a:t>
+            </a:r>
+            <a:r>
+              <a:rPr lang="en-US" dirty="0"/>
+              <a:t> fans (represented by the twitter icon) and GOSU AI. Don't know League of Legends? No problem, I'll give you a brief explanation of the game.</a:t>
+            </a:r>
+            <a:endParaRPr lang="pt-BR" dirty="0"/>
           </a:p>
         </p:txBody>
       </p:sp>
@@ -552,6 +1063,830 @@
     <p:extLst>
       <p:ext uri="{BB962C8B-B14F-4D97-AF65-F5344CB8AC3E}">
         <p14:creationId xmlns:p14="http://schemas.microsoft.com/office/powerpoint/2010/main" val="4079693871"/>
+      </p:ext>
+    </p:extLst>
+  </p:cSld>
+  <p:clrMapOvr>
+    <a:masterClrMapping/>
+  </p:clrMapOvr>
+</p:notes>
+</file>
+
+<file path=ppt/notesSlides/notesSlide3.xml><?xml version="1.0" encoding="utf-8"?>
+<p:notes xmlns:a="http://schemas.openxmlformats.org/drawingml/2006/main" xmlns:r="http://schemas.openxmlformats.org/officeDocument/2006/relationships" xmlns:p="http://schemas.openxmlformats.org/presentationml/2006/main">
+  <p:cSld>
+    <p:spTree>
+      <p:nvGrpSpPr>
+        <p:cNvPr id="1" name=""/>
+        <p:cNvGrpSpPr/>
+        <p:nvPr/>
+      </p:nvGrpSpPr>
+      <p:grpSpPr>
+        <a:xfrm>
+          <a:off x="0" y="0"/>
+          <a:ext cx="0" cy="0"/>
+          <a:chOff x="0" y="0"/>
+          <a:chExt cx="0" cy="0"/>
+        </a:xfrm>
+      </p:grpSpPr>
+      <p:sp>
+        <p:nvSpPr>
+          <p:cNvPr id="2" name="Espaço Reservado para Imagem de Slide 1"/>
+          <p:cNvSpPr>
+            <a:spLocks noGrp="1" noRot="1" noChangeAspect="1"/>
+          </p:cNvSpPr>
+          <p:nvPr>
+            <p:ph type="sldImg"/>
+          </p:nvPr>
+        </p:nvSpPr>
+        <p:spPr/>
+      </p:sp>
+      <p:sp>
+        <p:nvSpPr>
+          <p:cNvPr id="3" name="Espaço Reservado para Anotações 2"/>
+          <p:cNvSpPr>
+            <a:spLocks noGrp="1"/>
+          </p:cNvSpPr>
+          <p:nvPr>
+            <p:ph type="body" idx="1"/>
+          </p:nvPr>
+        </p:nvSpPr>
+        <p:spPr/>
+        <p:txBody>
+          <a:bodyPr/>
+          <a:lstStyle/>
+          <a:p>
+            <a:r>
+              <a:rPr lang="en-US" dirty="0"/>
+              <a:t>League of Legends (</a:t>
+            </a:r>
+            <a:r>
+              <a:rPr lang="en-US" dirty="0" err="1"/>
+              <a:t>LoL</a:t>
+            </a:r>
+            <a:r>
+              <a:rPr lang="en-US" dirty="0"/>
+              <a:t>) is a MOBA game developed Riot Games. Each match has two teams (red and blue) of five players fighting across three lanes. The main objective of the game is to destroy the enemy nexus, a structure localized on the base of each team, while simultaneously defending theirs. Before the match begins, players must select a character (also known as champion) before the match begins in a step called Picks and Bans Phase.</a:t>
+            </a:r>
+            <a:endParaRPr lang="pt-BR" dirty="0"/>
+          </a:p>
+        </p:txBody>
+      </p:sp>
+      <p:sp>
+        <p:nvSpPr>
+          <p:cNvPr id="4" name="Espaço Reservado para Número de Slide 3"/>
+          <p:cNvSpPr>
+            <a:spLocks noGrp="1"/>
+          </p:cNvSpPr>
+          <p:nvPr>
+            <p:ph type="sldNum" sz="quarter" idx="5"/>
+          </p:nvPr>
+        </p:nvSpPr>
+        <p:spPr/>
+        <p:txBody>
+          <a:bodyPr/>
+          <a:lstStyle/>
+          <a:p>
+            <a:fld id="{89E425CA-8A3B-4084-BB85-5B9C87A99CAF}" type="slidenum">
+              <a:rPr lang="pt-BR" smtClean="0"/>
+              <a:t>3</a:t>
+            </a:fld>
+            <a:endParaRPr lang="pt-BR"/>
+          </a:p>
+        </p:txBody>
+      </p:sp>
+    </p:spTree>
+    <p:extLst>
+      <p:ext uri="{BB962C8B-B14F-4D97-AF65-F5344CB8AC3E}">
+        <p14:creationId xmlns:p14="http://schemas.microsoft.com/office/powerpoint/2010/main" val="3321748718"/>
+      </p:ext>
+    </p:extLst>
+  </p:cSld>
+  <p:clrMapOvr>
+    <a:masterClrMapping/>
+  </p:clrMapOvr>
+</p:notes>
+</file>
+
+<file path=ppt/notesSlides/notesSlide4.xml><?xml version="1.0" encoding="utf-8"?>
+<p:notes xmlns:a="http://schemas.openxmlformats.org/drawingml/2006/main" xmlns:r="http://schemas.openxmlformats.org/officeDocument/2006/relationships" xmlns:p="http://schemas.openxmlformats.org/presentationml/2006/main">
+  <p:cSld>
+    <p:spTree>
+      <p:nvGrpSpPr>
+        <p:cNvPr id="1" name=""/>
+        <p:cNvGrpSpPr/>
+        <p:nvPr/>
+      </p:nvGrpSpPr>
+      <p:grpSpPr>
+        <a:xfrm>
+          <a:off x="0" y="0"/>
+          <a:ext cx="0" cy="0"/>
+          <a:chOff x="0" y="0"/>
+          <a:chExt cx="0" cy="0"/>
+        </a:xfrm>
+      </p:grpSpPr>
+      <p:sp>
+        <p:nvSpPr>
+          <p:cNvPr id="2" name="Espaço Reservado para Imagem de Slide 1"/>
+          <p:cNvSpPr>
+            <a:spLocks noGrp="1" noRot="1" noChangeAspect="1"/>
+          </p:cNvSpPr>
+          <p:nvPr>
+            <p:ph type="sldImg"/>
+          </p:nvPr>
+        </p:nvSpPr>
+        <p:spPr/>
+      </p:sp>
+      <p:sp>
+        <p:nvSpPr>
+          <p:cNvPr id="3" name="Espaço Reservado para Anotações 2"/>
+          <p:cNvSpPr>
+            <a:spLocks noGrp="1"/>
+          </p:cNvSpPr>
+          <p:nvPr>
+            <p:ph type="body" idx="1"/>
+          </p:nvPr>
+        </p:nvSpPr>
+        <p:spPr/>
+        <p:txBody>
+          <a:bodyPr/>
+          <a:lstStyle/>
+          <a:p>
+            <a:pPr marL="0" marR="0" lvl="0" indent="0" algn="l" defTabSz="914400" rtl="0" eaLnBrk="1" fontAlgn="auto" latinLnBrk="0" hangingPunct="1">
+              <a:lnSpc>
+                <a:spcPct val="100000"/>
+              </a:lnSpc>
+              <a:spcBef>
+                <a:spcPts val="0"/>
+              </a:spcBef>
+              <a:spcAft>
+                <a:spcPts val="0"/>
+              </a:spcAft>
+              <a:buClrTx/>
+              <a:buSzTx/>
+              <a:buFontTx/>
+              <a:buNone/>
+              <a:tabLst/>
+              <a:defRPr/>
+            </a:pPr>
+            <a:r>
+              <a:rPr lang="en-US" dirty="0"/>
+              <a:t>According to our findings, only</a:t>
+            </a:r>
+            <a:r>
+              <a:rPr lang="en-US" b="1" dirty="0"/>
+              <a:t> </a:t>
+            </a:r>
+            <a:r>
+              <a:rPr lang="en-US" b="0" dirty="0"/>
+              <a:t>Ani (2019) </a:t>
+            </a:r>
+            <a:r>
+              <a:rPr lang="en-US" dirty="0"/>
+              <a:t>conducted experiments using League of Legends pre-game information.</a:t>
+            </a:r>
+            <a:r>
+              <a:rPr lang="pt-BR" dirty="0"/>
+              <a:t> Victoria </a:t>
+            </a:r>
+            <a:r>
+              <a:rPr lang="pt-BR" dirty="0" err="1"/>
+              <a:t>predicts</a:t>
+            </a:r>
+            <a:r>
+              <a:rPr lang="pt-BR" dirty="0"/>
+              <a:t> </a:t>
+            </a:r>
+            <a:r>
+              <a:rPr lang="en-US" dirty="0"/>
+              <a:t>the winner of a </a:t>
+            </a:r>
+            <a:r>
+              <a:rPr lang="pt-BR" dirty="0"/>
+              <a:t>DOTA 2 match</a:t>
+            </a:r>
+            <a:r>
+              <a:rPr lang="en-US" dirty="0"/>
+              <a:t> throughout the game, focusing on the </a:t>
+            </a:r>
+            <a:r>
+              <a:rPr lang="en-US" dirty="0" err="1"/>
+              <a:t>explaination</a:t>
+            </a:r>
+            <a:r>
+              <a:rPr lang="en-US" dirty="0"/>
+              <a:t> to the spectators. Similar to this, Silva conducted experiments in different time intervals of League of Legends matches. Unlike the previous ones, Kim proposed a confidence-calibration method for predicting the winner of League of Legends matches.</a:t>
+            </a:r>
+          </a:p>
+          <a:p>
+            <a:pPr marL="0" marR="0" lvl="0" indent="0" algn="l" defTabSz="914400" rtl="0" eaLnBrk="1" fontAlgn="auto" latinLnBrk="0" hangingPunct="1">
+              <a:lnSpc>
+                <a:spcPct val="100000"/>
+              </a:lnSpc>
+              <a:spcBef>
+                <a:spcPts val="0"/>
+              </a:spcBef>
+              <a:spcAft>
+                <a:spcPts val="0"/>
+              </a:spcAft>
+              <a:buClrTx/>
+              <a:buSzTx/>
+              <a:buFontTx/>
+              <a:buNone/>
+              <a:tabLst/>
+              <a:defRPr/>
+            </a:pPr>
+            <a:endParaRPr lang="en-US" dirty="0"/>
+          </a:p>
+        </p:txBody>
+      </p:sp>
+      <p:sp>
+        <p:nvSpPr>
+          <p:cNvPr id="4" name="Espaço Reservado para Número de Slide 3"/>
+          <p:cNvSpPr>
+            <a:spLocks noGrp="1"/>
+          </p:cNvSpPr>
+          <p:nvPr>
+            <p:ph type="sldNum" sz="quarter" idx="5"/>
+          </p:nvPr>
+        </p:nvSpPr>
+        <p:spPr/>
+        <p:txBody>
+          <a:bodyPr/>
+          <a:lstStyle/>
+          <a:p>
+            <a:fld id="{89E425CA-8A3B-4084-BB85-5B9C87A99CAF}" type="slidenum">
+              <a:rPr lang="pt-BR" smtClean="0"/>
+              <a:t>4</a:t>
+            </a:fld>
+            <a:endParaRPr lang="pt-BR"/>
+          </a:p>
+        </p:txBody>
+      </p:sp>
+    </p:spTree>
+    <p:extLst>
+      <p:ext uri="{BB962C8B-B14F-4D97-AF65-F5344CB8AC3E}">
+        <p14:creationId xmlns:p14="http://schemas.microsoft.com/office/powerpoint/2010/main" val="3755579783"/>
+      </p:ext>
+    </p:extLst>
+  </p:cSld>
+  <p:clrMapOvr>
+    <a:masterClrMapping/>
+  </p:clrMapOvr>
+</p:notes>
+</file>
+
+<file path=ppt/notesSlides/notesSlide5.xml><?xml version="1.0" encoding="utf-8"?>
+<p:notes xmlns:a="http://schemas.openxmlformats.org/drawingml/2006/main" xmlns:r="http://schemas.openxmlformats.org/officeDocument/2006/relationships" xmlns:p="http://schemas.openxmlformats.org/presentationml/2006/main">
+  <p:cSld>
+    <p:spTree>
+      <p:nvGrpSpPr>
+        <p:cNvPr id="1" name=""/>
+        <p:cNvGrpSpPr/>
+        <p:nvPr/>
+      </p:nvGrpSpPr>
+      <p:grpSpPr>
+        <a:xfrm>
+          <a:off x="0" y="0"/>
+          <a:ext cx="0" cy="0"/>
+          <a:chOff x="0" y="0"/>
+          <a:chExt cx="0" cy="0"/>
+        </a:xfrm>
+      </p:grpSpPr>
+      <p:sp>
+        <p:nvSpPr>
+          <p:cNvPr id="2" name="Espaço Reservado para Imagem de Slide 1"/>
+          <p:cNvSpPr>
+            <a:spLocks noGrp="1" noRot="1" noChangeAspect="1"/>
+          </p:cNvSpPr>
+          <p:nvPr>
+            <p:ph type="sldImg"/>
+          </p:nvPr>
+        </p:nvSpPr>
+        <p:spPr/>
+      </p:sp>
+      <p:sp>
+        <p:nvSpPr>
+          <p:cNvPr id="3" name="Espaço Reservado para Anotações 2"/>
+          <p:cNvSpPr>
+            <a:spLocks noGrp="1"/>
+          </p:cNvSpPr>
+          <p:nvPr>
+            <p:ph type="body" idx="1"/>
+          </p:nvPr>
+        </p:nvSpPr>
+        <p:spPr/>
+        <p:txBody>
+          <a:bodyPr/>
+          <a:lstStyle/>
+          <a:p>
+            <a:r>
+              <a:rPr lang="en-US" dirty="0"/>
+              <a:t>We considered three main datasets for our experiments, and from the merger of some of them we generate two others. The first dataset displays the champions banned by both teams and the outcome of the match. The second features the champions selected by both teams and the result. Dataset 3 contains the performance history of the players with the champions they selected for the game, and datasets 4 and 5 are mergers of some of the previously presented datasets. Our goal with this division was to test different combinations of features. In addition, we also conducted other experiments to reinforce the importance of each of the features.</a:t>
+            </a:r>
+            <a:endParaRPr lang="pt-BR" dirty="0"/>
+          </a:p>
+        </p:txBody>
+      </p:sp>
+      <p:sp>
+        <p:nvSpPr>
+          <p:cNvPr id="4" name="Espaço Reservado para Número de Slide 3"/>
+          <p:cNvSpPr>
+            <a:spLocks noGrp="1"/>
+          </p:cNvSpPr>
+          <p:nvPr>
+            <p:ph type="sldNum" sz="quarter" idx="5"/>
+          </p:nvPr>
+        </p:nvSpPr>
+        <p:spPr/>
+        <p:txBody>
+          <a:bodyPr/>
+          <a:lstStyle/>
+          <a:p>
+            <a:fld id="{89E425CA-8A3B-4084-BB85-5B9C87A99CAF}" type="slidenum">
+              <a:rPr lang="pt-BR" smtClean="0"/>
+              <a:t>5</a:t>
+            </a:fld>
+            <a:endParaRPr lang="pt-BR"/>
+          </a:p>
+        </p:txBody>
+      </p:sp>
+    </p:spTree>
+    <p:extLst>
+      <p:ext uri="{BB962C8B-B14F-4D97-AF65-F5344CB8AC3E}">
+        <p14:creationId xmlns:p14="http://schemas.microsoft.com/office/powerpoint/2010/main" val="1153340678"/>
+      </p:ext>
+    </p:extLst>
+  </p:cSld>
+  <p:clrMapOvr>
+    <a:masterClrMapping/>
+  </p:clrMapOvr>
+</p:notes>
+</file>
+
+<file path=ppt/notesSlides/notesSlide6.xml><?xml version="1.0" encoding="utf-8"?>
+<p:notes xmlns:a="http://schemas.openxmlformats.org/drawingml/2006/main" xmlns:r="http://schemas.openxmlformats.org/officeDocument/2006/relationships" xmlns:p="http://schemas.openxmlformats.org/presentationml/2006/main">
+  <p:cSld>
+    <p:spTree>
+      <p:nvGrpSpPr>
+        <p:cNvPr id="1" name=""/>
+        <p:cNvGrpSpPr/>
+        <p:nvPr/>
+      </p:nvGrpSpPr>
+      <p:grpSpPr>
+        <a:xfrm>
+          <a:off x="0" y="0"/>
+          <a:ext cx="0" cy="0"/>
+          <a:chOff x="0" y="0"/>
+          <a:chExt cx="0" cy="0"/>
+        </a:xfrm>
+      </p:grpSpPr>
+      <p:sp>
+        <p:nvSpPr>
+          <p:cNvPr id="2" name="Espaço Reservado para Imagem de Slide 1"/>
+          <p:cNvSpPr>
+            <a:spLocks noGrp="1" noRot="1" noChangeAspect="1"/>
+          </p:cNvSpPr>
+          <p:nvPr>
+            <p:ph type="sldImg"/>
+          </p:nvPr>
+        </p:nvSpPr>
+        <p:spPr/>
+      </p:sp>
+      <p:sp>
+        <p:nvSpPr>
+          <p:cNvPr id="3" name="Espaço Reservado para Anotações 2"/>
+          <p:cNvSpPr>
+            <a:spLocks noGrp="1"/>
+          </p:cNvSpPr>
+          <p:nvPr>
+            <p:ph type="body" idx="1"/>
+          </p:nvPr>
+        </p:nvSpPr>
+        <p:spPr/>
+        <p:txBody>
+          <a:bodyPr/>
+          <a:lstStyle/>
+          <a:p>
+            <a:r>
+              <a:rPr lang="en-US" dirty="0"/>
+              <a:t>We conducted a benchmark comparison process using several machine learning algorithms. We executed a 10-fold cross-validation resampling with 5 repetitions. It is worth mentioning that the datasets were stratified to ensure the same class distribution on each partition. Since we have a binary classification problem, AUC was used as the performance measure.</a:t>
+            </a:r>
+            <a:endParaRPr lang="pt-BR" dirty="0"/>
+          </a:p>
+        </p:txBody>
+      </p:sp>
+      <p:sp>
+        <p:nvSpPr>
+          <p:cNvPr id="4" name="Espaço Reservado para Número de Slide 3"/>
+          <p:cNvSpPr>
+            <a:spLocks noGrp="1"/>
+          </p:cNvSpPr>
+          <p:nvPr>
+            <p:ph type="sldNum" sz="quarter" idx="5"/>
+          </p:nvPr>
+        </p:nvSpPr>
+        <p:spPr/>
+        <p:txBody>
+          <a:bodyPr/>
+          <a:lstStyle/>
+          <a:p>
+            <a:fld id="{89E425CA-8A3B-4084-BB85-5B9C87A99CAF}" type="slidenum">
+              <a:rPr lang="pt-BR" smtClean="0"/>
+              <a:t>6</a:t>
+            </a:fld>
+            <a:endParaRPr lang="pt-BR"/>
+          </a:p>
+        </p:txBody>
+      </p:sp>
+    </p:spTree>
+    <p:extLst>
+      <p:ext uri="{BB962C8B-B14F-4D97-AF65-F5344CB8AC3E}">
+        <p14:creationId xmlns:p14="http://schemas.microsoft.com/office/powerpoint/2010/main" val="77428112"/>
+      </p:ext>
+    </p:extLst>
+  </p:cSld>
+  <p:clrMapOvr>
+    <a:masterClrMapping/>
+  </p:clrMapOvr>
+</p:notes>
+</file>
+
+<file path=ppt/notesSlides/notesSlide7.xml><?xml version="1.0" encoding="utf-8"?>
+<p:notes xmlns:a="http://schemas.openxmlformats.org/drawingml/2006/main" xmlns:r="http://schemas.openxmlformats.org/officeDocument/2006/relationships" xmlns:p="http://schemas.openxmlformats.org/presentationml/2006/main">
+  <p:cSld>
+    <p:spTree>
+      <p:nvGrpSpPr>
+        <p:cNvPr id="1" name=""/>
+        <p:cNvGrpSpPr/>
+        <p:nvPr/>
+      </p:nvGrpSpPr>
+      <p:grpSpPr>
+        <a:xfrm>
+          <a:off x="0" y="0"/>
+          <a:ext cx="0" cy="0"/>
+          <a:chOff x="0" y="0"/>
+          <a:chExt cx="0" cy="0"/>
+        </a:xfrm>
+      </p:grpSpPr>
+      <p:sp>
+        <p:nvSpPr>
+          <p:cNvPr id="2" name="Espaço Reservado para Imagem de Slide 1"/>
+          <p:cNvSpPr>
+            <a:spLocks noGrp="1" noRot="1" noChangeAspect="1"/>
+          </p:cNvSpPr>
+          <p:nvPr>
+            <p:ph type="sldImg"/>
+          </p:nvPr>
+        </p:nvSpPr>
+        <p:spPr/>
+      </p:sp>
+      <p:sp>
+        <p:nvSpPr>
+          <p:cNvPr id="3" name="Espaço Reservado para Anotações 2"/>
+          <p:cNvSpPr>
+            <a:spLocks noGrp="1"/>
+          </p:cNvSpPr>
+          <p:nvPr>
+            <p:ph type="body" idx="1"/>
+          </p:nvPr>
+        </p:nvSpPr>
+        <p:spPr/>
+        <p:txBody>
+          <a:bodyPr/>
+          <a:lstStyle/>
+          <a:p>
+            <a:r>
+              <a:rPr lang="en-US" dirty="0"/>
+              <a:t>Our models achieved </a:t>
+            </a:r>
+            <a:r>
+              <a:rPr lang="en-US" b="1" dirty="0"/>
+              <a:t>0.97 of AUC</a:t>
+            </a:r>
+            <a:r>
+              <a:rPr lang="en-US" dirty="0"/>
+              <a:t> using </a:t>
+            </a:r>
+            <a:r>
+              <a:rPr lang="en-US" b="1" dirty="0"/>
+              <a:t>Random Forest and Logistic Regression</a:t>
+            </a:r>
+            <a:r>
+              <a:rPr lang="en-US" dirty="0"/>
+              <a:t> algorithms with </a:t>
+            </a:r>
+            <a:r>
+              <a:rPr lang="en-US" b="1" dirty="0"/>
+              <a:t>Players Statistics Dataset</a:t>
+            </a:r>
+            <a:r>
+              <a:rPr lang="en-US" dirty="0"/>
+              <a:t>. </a:t>
+            </a:r>
+            <a:r>
+              <a:rPr lang="pt-BR" dirty="0" err="1"/>
+              <a:t>However</a:t>
+            </a:r>
+            <a:r>
+              <a:rPr lang="pt-BR" dirty="0"/>
+              <a:t>, </a:t>
+            </a:r>
+            <a:r>
+              <a:rPr lang="pt-BR" dirty="0" err="1"/>
+              <a:t>datasets</a:t>
+            </a:r>
+            <a:r>
+              <a:rPr lang="pt-BR" dirty="0"/>
+              <a:t> </a:t>
+            </a:r>
+            <a:r>
+              <a:rPr lang="pt-BR" dirty="0" err="1"/>
+              <a:t>containing</a:t>
+            </a:r>
+            <a:r>
+              <a:rPr lang="pt-BR" dirty="0"/>
+              <a:t> </a:t>
+            </a:r>
+            <a:r>
+              <a:rPr lang="pt-BR" dirty="0" err="1"/>
+              <a:t>details</a:t>
+            </a:r>
+            <a:r>
+              <a:rPr lang="pt-BR" dirty="0"/>
+              <a:t> </a:t>
+            </a:r>
+            <a:r>
+              <a:rPr lang="pt-BR" dirty="0" err="1"/>
+              <a:t>about</a:t>
+            </a:r>
+            <a:r>
+              <a:rPr lang="pt-BR" dirty="0"/>
+              <a:t> </a:t>
+            </a:r>
+            <a:r>
+              <a:rPr lang="pt-BR" b="0" dirty="0" err="1"/>
+              <a:t>Banned</a:t>
+            </a:r>
+            <a:r>
+              <a:rPr lang="pt-BR" b="0" dirty="0"/>
+              <a:t> </a:t>
+            </a:r>
+            <a:r>
+              <a:rPr lang="pt-BR" b="0" dirty="0" err="1"/>
+              <a:t>Champions</a:t>
+            </a:r>
+            <a:r>
+              <a:rPr lang="pt-BR" b="0" dirty="0"/>
+              <a:t> </a:t>
+            </a:r>
+            <a:r>
+              <a:rPr lang="pt-BR" b="0" dirty="0" err="1"/>
+              <a:t>and</a:t>
+            </a:r>
+            <a:r>
+              <a:rPr lang="pt-BR" b="0" dirty="0"/>
+              <a:t> </a:t>
+            </a:r>
+            <a:r>
+              <a:rPr lang="pt-BR" b="0" dirty="0" err="1"/>
+              <a:t>Picked</a:t>
+            </a:r>
+            <a:r>
+              <a:rPr lang="pt-BR" b="0" dirty="0"/>
+              <a:t> </a:t>
+            </a:r>
+            <a:r>
+              <a:rPr lang="pt-BR" b="0" dirty="0" err="1"/>
+              <a:t>Champions</a:t>
+            </a:r>
+            <a:r>
+              <a:rPr lang="pt-BR" b="0" dirty="0"/>
+              <a:t> are </a:t>
+            </a:r>
+            <a:r>
+              <a:rPr lang="pt-BR" b="0" dirty="0" err="1"/>
+              <a:t>not</a:t>
+            </a:r>
+            <a:r>
+              <a:rPr lang="pt-BR" b="0" dirty="0"/>
+              <a:t> </a:t>
+            </a:r>
+            <a:r>
+              <a:rPr lang="en-US" b="0" dirty="0"/>
+              <a:t>descriptive enough </a:t>
+            </a:r>
+            <a:r>
+              <a:rPr lang="en-US" dirty="0"/>
+              <a:t>to provide useful information of the matches’ result, with AUC close to random guesses (that is 0.5).</a:t>
+            </a:r>
+            <a:endParaRPr lang="pt-BR" dirty="0"/>
+          </a:p>
+        </p:txBody>
+      </p:sp>
+      <p:sp>
+        <p:nvSpPr>
+          <p:cNvPr id="4" name="Espaço Reservado para Número de Slide 3"/>
+          <p:cNvSpPr>
+            <a:spLocks noGrp="1"/>
+          </p:cNvSpPr>
+          <p:nvPr>
+            <p:ph type="sldNum" sz="quarter" idx="5"/>
+          </p:nvPr>
+        </p:nvSpPr>
+        <p:spPr/>
+        <p:txBody>
+          <a:bodyPr/>
+          <a:lstStyle/>
+          <a:p>
+            <a:fld id="{89E425CA-8A3B-4084-BB85-5B9C87A99CAF}" type="slidenum">
+              <a:rPr lang="pt-BR" smtClean="0"/>
+              <a:t>7</a:t>
+            </a:fld>
+            <a:endParaRPr lang="pt-BR"/>
+          </a:p>
+        </p:txBody>
+      </p:sp>
+    </p:spTree>
+    <p:extLst>
+      <p:ext uri="{BB962C8B-B14F-4D97-AF65-F5344CB8AC3E}">
+        <p14:creationId xmlns:p14="http://schemas.microsoft.com/office/powerpoint/2010/main" val="590169770"/>
+      </p:ext>
+    </p:extLst>
+  </p:cSld>
+  <p:clrMapOvr>
+    <a:masterClrMapping/>
+  </p:clrMapOvr>
+</p:notes>
+</file>
+
+<file path=ppt/notesSlides/notesSlide8.xml><?xml version="1.0" encoding="utf-8"?>
+<p:notes xmlns:a="http://schemas.openxmlformats.org/drawingml/2006/main" xmlns:r="http://schemas.openxmlformats.org/officeDocument/2006/relationships" xmlns:p="http://schemas.openxmlformats.org/presentationml/2006/main">
+  <p:cSld>
+    <p:spTree>
+      <p:nvGrpSpPr>
+        <p:cNvPr id="1" name=""/>
+        <p:cNvGrpSpPr/>
+        <p:nvPr/>
+      </p:nvGrpSpPr>
+      <p:grpSpPr>
+        <a:xfrm>
+          <a:off x="0" y="0"/>
+          <a:ext cx="0" cy="0"/>
+          <a:chOff x="0" y="0"/>
+          <a:chExt cx="0" cy="0"/>
+        </a:xfrm>
+      </p:grpSpPr>
+      <p:sp>
+        <p:nvSpPr>
+          <p:cNvPr id="2" name="Espaço Reservado para Imagem de Slide 1"/>
+          <p:cNvSpPr>
+            <a:spLocks noGrp="1" noRot="1" noChangeAspect="1"/>
+          </p:cNvSpPr>
+          <p:nvPr>
+            <p:ph type="sldImg"/>
+          </p:nvPr>
+        </p:nvSpPr>
+        <p:spPr/>
+      </p:sp>
+      <p:sp>
+        <p:nvSpPr>
+          <p:cNvPr id="3" name="Espaço Reservado para Anotações 2"/>
+          <p:cNvSpPr>
+            <a:spLocks noGrp="1"/>
+          </p:cNvSpPr>
+          <p:nvPr>
+            <p:ph type="body" idx="1"/>
+          </p:nvPr>
+        </p:nvSpPr>
+        <p:spPr/>
+        <p:txBody>
+          <a:bodyPr/>
+          <a:lstStyle/>
+          <a:p>
+            <a:r>
+              <a:rPr lang="en-US" dirty="0"/>
+              <a:t>The figure presents the importance of features considering the Gini Importance and the Complete Dataset. As we can see, the less relevant features are linked to champions banned and selected by both teams, while the most important features are related to the players performance history. After an empirical analysis, we believe that the high importance of features linked to the blue team may be related to the Picks &amp; Bans order, since the blue team is the first to select. However, we have no scientific evidence on this, so we consider this to be a good future work.</a:t>
+            </a:r>
+            <a:endParaRPr lang="pt-BR" dirty="0"/>
+          </a:p>
+        </p:txBody>
+      </p:sp>
+      <p:sp>
+        <p:nvSpPr>
+          <p:cNvPr id="4" name="Espaço Reservado para Número de Slide 3"/>
+          <p:cNvSpPr>
+            <a:spLocks noGrp="1"/>
+          </p:cNvSpPr>
+          <p:nvPr>
+            <p:ph type="sldNum" sz="quarter" idx="5"/>
+          </p:nvPr>
+        </p:nvSpPr>
+        <p:spPr/>
+        <p:txBody>
+          <a:bodyPr/>
+          <a:lstStyle/>
+          <a:p>
+            <a:fld id="{89E425CA-8A3B-4084-BB85-5B9C87A99CAF}" type="slidenum">
+              <a:rPr lang="pt-BR" smtClean="0"/>
+              <a:t>8</a:t>
+            </a:fld>
+            <a:endParaRPr lang="pt-BR"/>
+          </a:p>
+        </p:txBody>
+      </p:sp>
+    </p:spTree>
+    <p:extLst>
+      <p:ext uri="{BB962C8B-B14F-4D97-AF65-F5344CB8AC3E}">
+        <p14:creationId xmlns:p14="http://schemas.microsoft.com/office/powerpoint/2010/main" val="1767853402"/>
+      </p:ext>
+    </p:extLst>
+  </p:cSld>
+  <p:clrMapOvr>
+    <a:masterClrMapping/>
+  </p:clrMapOvr>
+</p:notes>
+</file>
+
+<file path=ppt/notesSlides/notesSlide9.xml><?xml version="1.0" encoding="utf-8"?>
+<p:notes xmlns:a="http://schemas.openxmlformats.org/drawingml/2006/main" xmlns:r="http://schemas.openxmlformats.org/officeDocument/2006/relationships" xmlns:p="http://schemas.openxmlformats.org/presentationml/2006/main">
+  <p:cSld>
+    <p:spTree>
+      <p:nvGrpSpPr>
+        <p:cNvPr id="1" name=""/>
+        <p:cNvGrpSpPr/>
+        <p:nvPr/>
+      </p:nvGrpSpPr>
+      <p:grpSpPr>
+        <a:xfrm>
+          <a:off x="0" y="0"/>
+          <a:ext cx="0" cy="0"/>
+          <a:chOff x="0" y="0"/>
+          <a:chExt cx="0" cy="0"/>
+        </a:xfrm>
+      </p:grpSpPr>
+      <p:sp>
+        <p:nvSpPr>
+          <p:cNvPr id="2" name="Espaço Reservado para Imagem de Slide 1"/>
+          <p:cNvSpPr>
+            <a:spLocks noGrp="1" noRot="1" noChangeAspect="1"/>
+          </p:cNvSpPr>
+          <p:nvPr>
+            <p:ph type="sldImg"/>
+          </p:nvPr>
+        </p:nvSpPr>
+        <p:spPr/>
+      </p:sp>
+      <p:sp>
+        <p:nvSpPr>
+          <p:cNvPr id="3" name="Espaço Reservado para Anotações 2"/>
+          <p:cNvSpPr>
+            <a:spLocks noGrp="1"/>
+          </p:cNvSpPr>
+          <p:nvPr>
+            <p:ph type="body" idx="1"/>
+          </p:nvPr>
+        </p:nvSpPr>
+        <p:spPr/>
+        <p:txBody>
+          <a:bodyPr/>
+          <a:lstStyle/>
+          <a:p>
+            <a:r>
+              <a:rPr lang="en-US" dirty="0"/>
+              <a:t>Speaking of future work, we believe that predicting results in Professional League of Legends matches in the Picks &amp; Bans phase is a valuable, interesting and solvable problem. We also believe that, as mentioned by Kim, greater attention is needed on the reliability of predictions in order to avoid uncertain predictions. In the future we intend to perform similar experiments in professional matches of other games such as DOTA 2.</a:t>
+            </a:r>
+            <a:endParaRPr lang="pt-BR" dirty="0"/>
+          </a:p>
+        </p:txBody>
+      </p:sp>
+      <p:sp>
+        <p:nvSpPr>
+          <p:cNvPr id="4" name="Espaço Reservado para Número de Slide 3"/>
+          <p:cNvSpPr>
+            <a:spLocks noGrp="1"/>
+          </p:cNvSpPr>
+          <p:nvPr>
+            <p:ph type="sldNum" sz="quarter" idx="5"/>
+          </p:nvPr>
+        </p:nvSpPr>
+        <p:spPr/>
+        <p:txBody>
+          <a:bodyPr/>
+          <a:lstStyle/>
+          <a:p>
+            <a:fld id="{89E425CA-8A3B-4084-BB85-5B9C87A99CAF}" type="slidenum">
+              <a:rPr lang="pt-BR" smtClean="0"/>
+              <a:t>9</a:t>
+            </a:fld>
+            <a:endParaRPr lang="pt-BR"/>
+          </a:p>
+        </p:txBody>
+      </p:sp>
+    </p:spTree>
+    <p:extLst>
+      <p:ext uri="{BB962C8B-B14F-4D97-AF65-F5344CB8AC3E}">
+        <p14:creationId xmlns:p14="http://schemas.microsoft.com/office/powerpoint/2010/main" val="2027038588"/>
       </p:ext>
     </p:extLst>
   </p:cSld>
@@ -723,7 +2058,7 @@
         </p:blipFill>
         <p:spPr>
           <a:xfrm>
-            <a:off x="8158794" y="219583"/>
+            <a:off x="8943845" y="225588"/>
             <a:ext cx="1800000" cy="777718"/>
           </a:xfrm>
           <a:prstGeom prst="rect">
@@ -759,8 +2094,8 @@
         </p:blipFill>
         <p:spPr>
           <a:xfrm>
-            <a:off x="10356332" y="77974"/>
-            <a:ext cx="1800000" cy="1103833"/>
+            <a:off x="10864735" y="255150"/>
+            <a:ext cx="1220004" cy="748156"/>
           </a:xfrm>
           <a:prstGeom prst="rect">
             <a:avLst/>
@@ -796,8 +2131,102 @@
         </p:blipFill>
         <p:spPr bwMode="auto">
           <a:xfrm>
-            <a:off x="7022969" y="77974"/>
-            <a:ext cx="1014935" cy="1014935"/>
+            <a:off x="4875746" y="155930"/>
+            <a:ext cx="855497" cy="855497"/>
+          </a:xfrm>
+          <a:prstGeom prst="rect">
+            <a:avLst/>
+          </a:prstGeom>
+          <a:noFill/>
+          <a:extLst>
+            <a:ext uri="{909E8E84-426E-40DD-AFC4-6F175D3DCCD1}">
+              <a14:hiddenFill xmlns:a14="http://schemas.microsoft.com/office/drawing/2010/main">
+                <a:solidFill>
+                  <a:srgbClr val="FFFFFF"/>
+                </a:solidFill>
+              </a14:hiddenFill>
+            </a:ext>
+          </a:extLst>
+        </p:spPr>
+      </p:pic>
+      <p:pic>
+        <p:nvPicPr>
+          <p:cNvPr id="4" name="Picture 2" descr="Identidade Visual — Português (Brasil)">
+            <a:extLst>
+              <a:ext uri="{FF2B5EF4-FFF2-40B4-BE49-F238E27FC236}">
+                <a16:creationId xmlns:a16="http://schemas.microsoft.com/office/drawing/2014/main" id="{DCD08380-73BE-47A3-97C8-B5BF7D3C8E57}"/>
+              </a:ext>
+            </a:extLst>
+          </p:cNvPr>
+          <p:cNvPicPr>
+            <a:picLocks noChangeAspect="1" noChangeArrowheads="1"/>
+          </p:cNvPicPr>
+          <p:nvPr userDrawn="1"/>
+        </p:nvPicPr>
+        <p:blipFill>
+          <a:blip r:embed="rId5">
+            <a:extLst>
+              <a:ext uri="{28A0092B-C50C-407E-A947-70E740481C1C}">
+                <a14:useLocalDpi xmlns:a14="http://schemas.microsoft.com/office/drawing/2010/main" val="0"/>
+              </a:ext>
+            </a:extLst>
+          </a:blip>
+          <a:srcRect/>
+          <a:stretch>
+            <a:fillRect/>
+          </a:stretch>
+        </p:blipFill>
+        <p:spPr bwMode="auto">
+          <a:xfrm>
+            <a:off x="5852133" y="187648"/>
+            <a:ext cx="855497" cy="792059"/>
+          </a:xfrm>
+          <a:prstGeom prst="rect">
+            <a:avLst/>
+          </a:prstGeom>
+          <a:noFill/>
+          <a:extLst>
+            <a:ext uri="{909E8E84-426E-40DD-AFC4-6F175D3DCCD1}">
+              <a14:hiddenFill xmlns:a14="http://schemas.microsoft.com/office/drawing/2010/main">
+                <a:solidFill>
+                  <a:srgbClr val="FFFFFF"/>
+                </a:solidFill>
+              </a14:hiddenFill>
+            </a:ext>
+          </a:extLst>
+        </p:spPr>
+      </p:pic>
+      <p:pic>
+        <p:nvPicPr>
+          <p:cNvPr id="2052" name="Picture 4" descr="logo UTFPR — Universidade Tecnológica Federal do Paraná UTFPR">
+            <a:extLst>
+              <a:ext uri="{FF2B5EF4-FFF2-40B4-BE49-F238E27FC236}">
+                <a16:creationId xmlns:a16="http://schemas.microsoft.com/office/drawing/2014/main" id="{28A3C368-C678-4C6E-B5EE-C386E069518B}"/>
+              </a:ext>
+            </a:extLst>
+          </p:cNvPr>
+          <p:cNvPicPr>
+            <a:picLocks noChangeAspect="1" noChangeArrowheads="1"/>
+          </p:cNvPicPr>
+          <p:nvPr userDrawn="1"/>
+        </p:nvPicPr>
+        <p:blipFill>
+          <a:blip r:embed="rId6">
+            <a:extLst>
+              <a:ext uri="{28A0092B-C50C-407E-A947-70E740481C1C}">
+                <a14:useLocalDpi xmlns:a14="http://schemas.microsoft.com/office/drawing/2010/main" val="0"/>
+              </a:ext>
+            </a:extLst>
+          </a:blip>
+          <a:srcRect/>
+          <a:stretch>
+            <a:fillRect/>
+          </a:stretch>
+        </p:blipFill>
+        <p:spPr bwMode="auto">
+          <a:xfrm>
+            <a:off x="6828520" y="219367"/>
+            <a:ext cx="1994435" cy="792061"/>
           </a:xfrm>
           <a:prstGeom prst="rect">
             <a:avLst/>
@@ -970,7 +2399,7 @@
           <a:p>
             <a:fld id="{03256F8D-B97E-43C1-A362-ACCCB0902852}" type="datetime1">
               <a:rPr lang="pt-BR" smtClean="0"/>
-              <a:t>16/08/2021</a:t>
+              <a:t>18/08/2021</a:t>
             </a:fld>
             <a:endParaRPr lang="pt-BR" dirty="0"/>
           </a:p>
@@ -1303,7 +2732,7 @@
           <a:p>
             <a:fld id="{527616B3-5C92-49D6-B64F-E0CE165CAC41}" type="datetime1">
               <a:rPr lang="pt-BR" smtClean="0"/>
-              <a:t>16/08/2021</a:t>
+              <a:t>18/08/2021</a:t>
             </a:fld>
             <a:endParaRPr lang="pt-BR">
               <a:latin typeface="Fira Sans" panose="020B0503050000020004" pitchFamily="34" charset="0"/>
@@ -1626,7 +3055,7 @@
           <a:p>
             <a:fld id="{527616B3-5C92-49D6-B64F-E0CE165CAC41}" type="datetime1">
               <a:rPr lang="pt-BR" smtClean="0"/>
-              <a:t>16/08/2021</a:t>
+              <a:t>18/08/2021</a:t>
             </a:fld>
             <a:endParaRPr lang="pt-BR">
               <a:latin typeface="Fira Sans" panose="020B0503050000020004" pitchFamily="34" charset="0"/>
@@ -2135,7 +3564,7 @@
           <a:p>
             <a:fld id="{527616B3-5C92-49D6-B64F-E0CE165CAC41}" type="datetime1">
               <a:rPr lang="pt-BR" smtClean="0"/>
-              <a:t>16/08/2021</a:t>
+              <a:t>18/08/2021</a:t>
             </a:fld>
             <a:endParaRPr lang="pt-BR">
               <a:latin typeface="Fira Sans" panose="020B0503050000020004" pitchFamily="34" charset="0"/>
@@ -2296,7 +3725,7 @@
           <a:p>
             <a:fld id="{34DF4699-49A3-4FAC-9074-EE48978C0213}" type="datetime1">
               <a:rPr lang="pt-BR" smtClean="0"/>
-              <a:t>16/08/2021</a:t>
+              <a:t>18/08/2021</a:t>
             </a:fld>
             <a:endParaRPr lang="pt-BR"/>
           </a:p>
@@ -2413,7 +3842,7 @@
           <a:p>
             <a:fld id="{527616B3-5C92-49D6-B64F-E0CE165CAC41}" type="datetime1">
               <a:rPr lang="pt-BR" smtClean="0"/>
-              <a:t>16/08/2021</a:t>
+              <a:t>18/08/2021</a:t>
             </a:fld>
             <a:endParaRPr lang="pt-BR">
               <a:latin typeface="Fira Sans" panose="020B0503050000020004" pitchFamily="34" charset="0"/>
@@ -2810,7 +4239,7 @@
           <a:p>
             <a:fld id="{527616B3-5C92-49D6-B64F-E0CE165CAC41}" type="datetime1">
               <a:rPr lang="pt-BR" smtClean="0"/>
-              <a:t>16/08/2021</a:t>
+              <a:t>18/08/2021</a:t>
             </a:fld>
             <a:endParaRPr lang="pt-BR">
               <a:latin typeface="Fira Sans" panose="020B0503050000020004" pitchFamily="34" charset="0"/>
@@ -3345,7 +4774,7 @@
           <a:p>
             <a:r>
               <a:rPr lang="pt-BR" dirty="0"/>
-              <a:t>PESC/COPPE</a:t>
+              <a:t>PESC/COPPE/UFRJ</a:t>
             </a:r>
           </a:p>
           <a:p>
@@ -3458,13 +4887,21 @@
           <a:p>
             <a:r>
               <a:rPr lang="pt-BR" dirty="0"/>
-              <a:t>Lincoln M. Costa</a:t>
-            </a:r>
-          </a:p>
-          <a:p>
-            <a:r>
-              <a:rPr lang="pt-BR" dirty="0"/>
-              <a:t>PESC/COPPE</a:t>
+              <a:t>Lincoln M. Costa , Rafael G. Mantovani, Francisco Carlos M. Souza, Geraldo </a:t>
+            </a:r>
+            <a:r>
+              <a:rPr lang="pt-BR" dirty="0" err="1"/>
+              <a:t>Xexéo</a:t>
+            </a:r>
+            <a:r>
+              <a:rPr lang="pt-BR" dirty="0"/>
+              <a:t>.</a:t>
+            </a:r>
+          </a:p>
+          <a:p>
+            <a:r>
+              <a:rPr lang="pt-BR" dirty="0"/>
+              <a:t>PESC/COPPE/UFRJ</a:t>
             </a:r>
           </a:p>
           <a:p>
@@ -3490,7 +4927,7 @@
           <p:nvPr/>
         </p:nvPicPr>
         <p:blipFill>
-          <a:blip r:embed="rId2"/>
+          <a:blip r:embed="rId3"/>
           <a:stretch>
             <a:fillRect/>
           </a:stretch>
@@ -3559,7 +4996,7 @@
             <a:fld id="{8EFE941A-E170-432C-9C6F-1589B8418E42}" type="datetime1">
               <a:rPr lang="pt-BR" smtClean="0"/>
               <a:pPr/>
-              <a:t>16/08/2021</a:t>
+              <a:t>18/08/2021</a:t>
             </a:fld>
             <a:endParaRPr lang="pt-BR" dirty="0"/>
           </a:p>
@@ -3619,7 +5056,10 @@
               <a:pPr/>
               <a:t>2</a:t>
             </a:fld>
-            <a:endParaRPr lang="pt-BR"/>
+            <a:r>
+              <a:rPr lang="pt-BR" dirty="0"/>
+              <a:t>/9</a:t>
+            </a:r>
           </a:p>
         </p:txBody>
       </p:sp>
@@ -3710,8 +5150,54 @@
         </p:blipFill>
         <p:spPr>
           <a:xfrm>
-            <a:off x="5832791" y="1676993"/>
+            <a:off x="651193" y="1676993"/>
             <a:ext cx="6237288" cy="3504014"/>
+          </a:xfrm>
+          <a:prstGeom prst="rect">
+            <a:avLst/>
+          </a:prstGeom>
+          <a:ln>
+            <a:noFill/>
+          </a:ln>
+          <a:effectLst>
+            <a:outerShdw blurRad="190500" algn="tl" rotWithShape="0">
+              <a:srgbClr val="000000">
+                <a:alpha val="70000"/>
+              </a:srgbClr>
+            </a:outerShdw>
+          </a:effectLst>
+        </p:spPr>
+      </p:pic>
+      <p:pic>
+        <p:nvPicPr>
+          <p:cNvPr id="10" name="Imagem 9">
+            <a:extLst>
+              <a:ext uri="{FF2B5EF4-FFF2-40B4-BE49-F238E27FC236}">
+                <a16:creationId xmlns:a16="http://schemas.microsoft.com/office/drawing/2014/main" id="{3439BAD5-D9CE-4031-9F62-31A534D5CDB7}"/>
+              </a:ext>
+            </a:extLst>
+          </p:cNvPr>
+          <p:cNvPicPr>
+            <a:picLocks noChangeAspect="1"/>
+          </p:cNvPicPr>
+          <p:nvPr/>
+        </p:nvPicPr>
+        <p:blipFill>
+          <a:blip r:embed="rId4">
+            <a:extLst>
+              <a:ext uri="{28A0092B-C50C-407E-A947-70E740481C1C}">
+                <a14:useLocalDpi xmlns:a14="http://schemas.microsoft.com/office/drawing/2010/main" val="0"/>
+              </a:ext>
+            </a:extLst>
+          </a:blip>
+          <a:stretch>
+            <a:fillRect/>
+          </a:stretch>
+        </p:blipFill>
+        <p:spPr>
+          <a:xfrm>
+            <a:off x="7421880" y="1371600"/>
+            <a:ext cx="4114800" cy="4114800"/>
           </a:xfrm>
           <a:prstGeom prst="rect">
             <a:avLst/>
@@ -3775,7 +5261,7 @@
           </p:nvPr>
         </p:nvPicPr>
         <p:blipFill>
-          <a:blip r:embed="rId2">
+          <a:blip r:embed="rId3">
             <a:extLst>
               <a:ext uri="{28A0092B-C50C-407E-A947-70E740481C1C}">
                 <a14:useLocalDpi xmlns:a14="http://schemas.microsoft.com/office/drawing/2010/main" val="0"/>
@@ -3788,7 +5274,7 @@
         </p:blipFill>
         <p:spPr>
           <a:xfrm>
-            <a:off x="5234465" y="2438400"/>
+            <a:off x="755170" y="1400519"/>
             <a:ext cx="6566859" cy="3447601"/>
           </a:xfrm>
           <a:prstGeom prst="rect">
@@ -3830,7 +5316,7 @@
             <a:fld id="{8EFE941A-E170-432C-9C6F-1589B8418E42}" type="datetime1">
               <a:rPr lang="pt-BR" smtClean="0"/>
               <a:pPr/>
-              <a:t>16/08/2021</a:t>
+              <a:t>18/08/2021</a:t>
             </a:fld>
             <a:endParaRPr lang="pt-BR" dirty="0"/>
           </a:p>
@@ -3890,7 +5376,10 @@
               <a:pPr/>
               <a:t>3</a:t>
             </a:fld>
-            <a:endParaRPr lang="pt-BR"/>
+            <a:r>
+              <a:rPr lang="pt-BR" dirty="0"/>
+              <a:t>/9</a:t>
+            </a:r>
           </a:p>
         </p:txBody>
       </p:sp>
@@ -3950,7 +5439,7 @@
           <p:nvPr/>
         </p:nvPicPr>
         <p:blipFill>
-          <a:blip r:embed="rId3">
+          <a:blip r:embed="rId4">
             <a:extLst>
               <a:ext uri="{28A0092B-C50C-407E-A947-70E740481C1C}">
                 <a14:useLocalDpi xmlns:a14="http://schemas.microsoft.com/office/drawing/2010/main" val="0"/>
@@ -3963,7 +5452,7 @@
         </p:blipFill>
         <p:spPr>
           <a:xfrm>
-            <a:off x="719992" y="1626710"/>
+            <a:off x="6612774" y="2908749"/>
             <a:ext cx="5109916" cy="2874328"/>
           </a:xfrm>
           <a:prstGeom prst="rect">
@@ -4035,7 +5524,7 @@
             <a:fld id="{8EFE941A-E170-432C-9C6F-1589B8418E42}" type="datetime1">
               <a:rPr lang="pt-BR" smtClean="0"/>
               <a:pPr/>
-              <a:t>16/08/2021</a:t>
+              <a:t>18/08/2021</a:t>
             </a:fld>
             <a:endParaRPr lang="pt-BR" dirty="0"/>
           </a:p>
@@ -4095,7 +5584,10 @@
               <a:pPr/>
               <a:t>4</a:t>
             </a:fld>
-            <a:endParaRPr lang="pt-BR"/>
+            <a:r>
+              <a:rPr lang="pt-BR" dirty="0"/>
+              <a:t>/9</a:t>
+            </a:r>
           </a:p>
         </p:txBody>
       </p:sp>
@@ -4154,8 +5646,24 @@
         </p:nvSpPr>
         <p:spPr/>
         <p:txBody>
-          <a:bodyPr/>
+          <a:bodyPr>
+            <a:normAutofit/>
+          </a:bodyPr>
           <a:lstStyle/>
+          <a:p>
+            <a:r>
+              <a:rPr lang="en-US" dirty="0"/>
+              <a:t>According to our findings, only</a:t>
+            </a:r>
+            <a:r>
+              <a:rPr lang="en-US" b="1" dirty="0"/>
+              <a:t> Ani (2019)</a:t>
+            </a:r>
+            <a:r>
+              <a:rPr lang="en-US" dirty="0"/>
+              <a:t> conducted experiments using League of Legends pre-game information.</a:t>
+            </a:r>
+          </a:p>
           <a:p>
             <a:r>
               <a:rPr lang="pt-BR" b="1" dirty="0"/>
@@ -4171,7 +5679,7 @@
             </a:r>
             <a:r>
               <a:rPr lang="en-US" dirty="0"/>
-              <a:t>focused on the audience experience while watching DOTA 2 games and aims to explain professional esports matches to the spectators as the matches progress by accurately predicting the winner throughout the game. They achieved 85% of accuracy after 5 minutes of gameplay.</a:t>
+              <a:t>focused on the audience experience while watching DOTA 2 games and aims to explain professional esports matches to the spectators as the matches progress by accurately predicting the winner throughout the game.</a:t>
             </a:r>
           </a:p>
           <a:p>
@@ -4193,7 +5701,7 @@
             </a:r>
             <a:r>
               <a:rPr lang="en-US" dirty="0"/>
-              <a:t>studied the prediction of League of Legends in specifics time interval and reached 83% in the interval of 20 to 25 minutes.</a:t>
+              <a:t>studied the prediction of League of Legends in specifics time interval.</a:t>
             </a:r>
           </a:p>
           <a:p>
@@ -4213,7 +5721,6 @@
               <a:rPr lang="en-US" dirty="0"/>
               <a:t>proposed a confidence-calibration method for predicting the winner of League of Legends matches.</a:t>
             </a:r>
-            <a:endParaRPr lang="pt-BR" b="1" dirty="0"/>
           </a:p>
         </p:txBody>
       </p:sp>
@@ -4271,7 +5778,7 @@
             <a:fld id="{8EFE941A-E170-432C-9C6F-1589B8418E42}" type="datetime1">
               <a:rPr lang="pt-BR" smtClean="0"/>
               <a:pPr/>
-              <a:t>16/08/2021</a:t>
+              <a:t>18/08/2021</a:t>
             </a:fld>
             <a:endParaRPr lang="pt-BR" dirty="0"/>
           </a:p>
@@ -4331,7 +5838,10 @@
               <a:pPr/>
               <a:t>5</a:t>
             </a:fld>
-            <a:endParaRPr lang="pt-BR"/>
+            <a:r>
+              <a:rPr lang="pt-BR" dirty="0"/>
+              <a:t>/9</a:t>
+            </a:r>
           </a:p>
         </p:txBody>
       </p:sp>
@@ -4388,14 +5898,14 @@
             <p:ph idx="1"/>
             <p:extLst>
               <p:ext uri="{D42A27DB-BD31-4B8C-83A1-F6EECF244321}">
-                <p14:modId xmlns:p14="http://schemas.microsoft.com/office/powerpoint/2010/main" val="3357634858"/>
+                <p14:modId xmlns:p14="http://schemas.microsoft.com/office/powerpoint/2010/main" val="939191939"/>
               </p:ext>
             </p:extLst>
           </p:nvPr>
         </p:nvGraphicFramePr>
         <p:xfrm>
-          <a:off x="157479" y="2316480"/>
-          <a:ext cx="11912600" cy="3032760"/>
+          <a:off x="157479" y="2181860"/>
+          <a:ext cx="11912600" cy="2494280"/>
         </p:xfrm>
         <a:graphic>
           <a:graphicData uri="http://schemas.openxmlformats.org/drawingml/2006/table">
@@ -4404,14 +5914,21 @@
                 <a:tableStyleId>{073A0DAA-6AF3-43AB-8588-CEC1D06C72B9}</a:tableStyleId>
               </a:tblPr>
               <a:tblGrid>
-                <a:gridCol w="4455161">
+                <a:gridCol w="807721">
+                  <a:extLst>
+                    <a:ext uri="{9D8B030D-6E8A-4147-A177-3AD203B41FA5}">
+                      <a16:colId xmlns:a16="http://schemas.microsoft.com/office/drawing/2014/main" val="3790510155"/>
+                    </a:ext>
+                  </a:extLst>
+                </a:gridCol>
+                <a:gridCol w="4470400">
                   <a:extLst>
                     <a:ext uri="{9D8B030D-6E8A-4147-A177-3AD203B41FA5}">
                       <a16:colId xmlns:a16="http://schemas.microsoft.com/office/drawing/2014/main" val="1348371840"/>
                     </a:ext>
                   </a:extLst>
                 </a:gridCol>
-                <a:gridCol w="7457439">
+                <a:gridCol w="6634479">
                   <a:extLst>
                     <a:ext uri="{9D8B030D-6E8A-4147-A177-3AD203B41FA5}">
                       <a16:colId xmlns:a16="http://schemas.microsoft.com/office/drawing/2014/main" val="612959768"/>
@@ -4420,6 +5937,21 @@
                 </a:gridCol>
               </a:tblGrid>
               <a:tr h="370840">
+                <a:tc>
+                  <a:txBody>
+                    <a:bodyPr/>
+                    <a:lstStyle/>
+                    <a:p>
+                      <a:r>
+                        <a:rPr lang="pt-BR" dirty="0">
+                          <a:latin typeface="Fira Sans" panose="020B0503050000020004" pitchFamily="34" charset="0"/>
+                        </a:rPr>
+                        <a:t>Id</a:t>
+                      </a:r>
+                    </a:p>
+                  </a:txBody>
+                  <a:tcPr/>
+                </a:tc>
                 <a:tc>
                   <a:txBody>
                     <a:bodyPr/>
@@ -4463,6 +5995,21 @@
                 </a:extLst>
               </a:tr>
               <a:tr h="370840">
+                <a:tc>
+                  <a:txBody>
+                    <a:bodyPr/>
+                    <a:lstStyle/>
+                    <a:p>
+                      <a:r>
+                        <a:rPr lang="pt-BR" dirty="0">
+                          <a:latin typeface="Fira Sans" panose="020B0503050000020004" pitchFamily="34" charset="0"/>
+                        </a:rPr>
+                        <a:t>1</a:t>
+                      </a:r>
+                    </a:p>
+                  </a:txBody>
+                  <a:tcPr/>
+                </a:tc>
                 <a:tc>
                   <a:txBody>
                     <a:bodyPr/>
@@ -4518,6 +6065,21 @@
                 </a:extLst>
               </a:tr>
               <a:tr h="370840">
+                <a:tc>
+                  <a:txBody>
+                    <a:bodyPr/>
+                    <a:lstStyle/>
+                    <a:p>
+                      <a:r>
+                        <a:rPr lang="pt-BR" dirty="0">
+                          <a:latin typeface="Fira Sans" panose="020B0503050000020004" pitchFamily="34" charset="0"/>
+                        </a:rPr>
+                        <a:t>2</a:t>
+                      </a:r>
+                    </a:p>
+                  </a:txBody>
+                  <a:tcPr/>
+                </a:tc>
                 <a:tc>
                   <a:txBody>
                     <a:bodyPr/>
@@ -4582,6 +6144,21 @@
                         <a:rPr lang="pt-BR" dirty="0">
                           <a:latin typeface="Fira Sans" panose="020B0503050000020004" pitchFamily="34" charset="0"/>
                         </a:rPr>
+                        <a:t>3</a:t>
+                      </a:r>
+                    </a:p>
+                  </a:txBody>
+                  <a:tcPr/>
+                </a:tc>
+                <a:tc>
+                  <a:txBody>
+                    <a:bodyPr/>
+                    <a:lstStyle/>
+                    <a:p>
+                      <a:r>
+                        <a:rPr lang="pt-BR" dirty="0">
+                          <a:latin typeface="Fira Sans" panose="020B0503050000020004" pitchFamily="34" charset="0"/>
+                        </a:rPr>
                         <a:t>Players </a:t>
                       </a:r>
                       <a:r>
@@ -4606,7 +6183,7 @@
                         <a:rPr lang="en-US" dirty="0">
                           <a:latin typeface="Fira Sans" panose="020B0503050000020004" pitchFamily="34" charset="0"/>
                         </a:rPr>
-                        <a:t>Performance history of the players with the champions they selected for the game</a:t>
+                        <a:t>Performance history (Win Rate, KDA ratio and Game Played) of the players with the champions they selected for the game</a:t>
                       </a:r>
                       <a:endParaRPr lang="pt-BR" dirty="0">
                         <a:latin typeface="Fira Sans" panose="020B0503050000020004" pitchFamily="34" charset="0"/>
@@ -4622,6 +6199,21 @@
                 </a:extLst>
               </a:tr>
               <a:tr h="370840">
+                <a:tc>
+                  <a:txBody>
+                    <a:bodyPr/>
+                    <a:lstStyle/>
+                    <a:p>
+                      <a:r>
+                        <a:rPr lang="pt-BR" dirty="0">
+                          <a:latin typeface="Fira Sans" panose="020B0503050000020004" pitchFamily="34" charset="0"/>
+                        </a:rPr>
+                        <a:t>4</a:t>
+                      </a:r>
+                    </a:p>
+                  </a:txBody>
+                  <a:tcPr/>
+                </a:tc>
                 <a:tc>
                   <a:txBody>
                     <a:bodyPr/>
@@ -4774,19 +6366,7 @@
                         <a:rPr lang="pt-BR" dirty="0">
                           <a:latin typeface="Fira Sans" panose="020B0503050000020004" pitchFamily="34" charset="0"/>
                         </a:rPr>
-                        <a:t> performance (</a:t>
-                      </a:r>
-                      <a:r>
-                        <a:rPr lang="pt-BR" dirty="0" err="1">
-                          <a:latin typeface="Fira Sans" panose="020B0503050000020004" pitchFamily="34" charset="0"/>
-                        </a:rPr>
-                        <a:t>Picked</a:t>
-                      </a:r>
-                      <a:r>
-                        <a:rPr lang="pt-BR" dirty="0">
-                          <a:latin typeface="Fira Sans" panose="020B0503050000020004" pitchFamily="34" charset="0"/>
-                        </a:rPr>
-                        <a:t> </a:t>
+                        <a:t> performance (2 </a:t>
                       </a:r>
                       <a:r>
                         <a:rPr lang="pt-BR" dirty="0" err="1">
@@ -4798,19 +6378,7 @@
                         <a:rPr lang="pt-BR" dirty="0">
                           <a:latin typeface="Fira Sans" panose="020B0503050000020004" pitchFamily="34" charset="0"/>
                         </a:rPr>
-                        <a:t> </a:t>
-                      </a:r>
-                      <a:r>
-                        <a:rPr lang="pt-BR" dirty="0" err="1">
-                          <a:latin typeface="Fira Sans" panose="020B0503050000020004" pitchFamily="34" charset="0"/>
-                        </a:rPr>
-                        <a:t>Statistics</a:t>
-                      </a:r>
-                      <a:r>
-                        <a:rPr lang="pt-BR" dirty="0">
-                          <a:latin typeface="Fira Sans" panose="020B0503050000020004" pitchFamily="34" charset="0"/>
-                        </a:rPr>
-                        <a:t>)</a:t>
+                        <a:t> 3)</a:t>
                       </a:r>
                     </a:p>
                   </a:txBody>
@@ -4823,6 +6391,21 @@
                 </a:extLst>
               </a:tr>
               <a:tr h="370840">
+                <a:tc>
+                  <a:txBody>
+                    <a:bodyPr/>
+                    <a:lstStyle/>
+                    <a:p>
+                      <a:r>
+                        <a:rPr lang="pt-BR" dirty="0">
+                          <a:latin typeface="Fira Sans" panose="020B0503050000020004" pitchFamily="34" charset="0"/>
+                        </a:rPr>
+                        <a:t>5</a:t>
+                      </a:r>
+                    </a:p>
+                  </a:txBody>
+                  <a:tcPr/>
+                </a:tc>
                 <a:tc>
                   <a:txBody>
                     <a:bodyPr/>
@@ -4907,31 +6490,7 @@
                         <a:rPr lang="pt-BR" dirty="0">
                           <a:latin typeface="Fira Sans" panose="020B0503050000020004" pitchFamily="34" charset="0"/>
                         </a:rPr>
-                        <a:t> (</a:t>
-                      </a:r>
-                      <a:r>
-                        <a:rPr lang="pt-BR" dirty="0" err="1">
-                          <a:latin typeface="Fira Sans" panose="020B0503050000020004" pitchFamily="34" charset="0"/>
-                        </a:rPr>
-                        <a:t>Banned</a:t>
-                      </a:r>
-                      <a:r>
-                        <a:rPr lang="pt-BR" dirty="0">
-                          <a:latin typeface="Fira Sans" panose="020B0503050000020004" pitchFamily="34" charset="0"/>
-                        </a:rPr>
-                        <a:t>, </a:t>
-                      </a:r>
-                      <a:r>
-                        <a:rPr lang="pt-BR" dirty="0" err="1">
-                          <a:latin typeface="Fira Sans" panose="020B0503050000020004" pitchFamily="34" charset="0"/>
-                        </a:rPr>
-                        <a:t>Picked</a:t>
-                      </a:r>
-                      <a:r>
-                        <a:rPr lang="pt-BR" dirty="0">
-                          <a:latin typeface="Fira Sans" panose="020B0503050000020004" pitchFamily="34" charset="0"/>
-                        </a:rPr>
-                        <a:t> </a:t>
+                        <a:t> (1, 2 </a:t>
                       </a:r>
                       <a:r>
                         <a:rPr lang="pt-BR" dirty="0" err="1">
@@ -4943,19 +6502,7 @@
                         <a:rPr lang="pt-BR" dirty="0">
                           <a:latin typeface="Fira Sans" panose="020B0503050000020004" pitchFamily="34" charset="0"/>
                         </a:rPr>
-                        <a:t> </a:t>
-                      </a:r>
-                      <a:r>
-                        <a:rPr lang="pt-BR" dirty="0" err="1">
-                          <a:latin typeface="Fira Sans" panose="020B0503050000020004" pitchFamily="34" charset="0"/>
-                        </a:rPr>
-                        <a:t>Statistics</a:t>
-                      </a:r>
-                      <a:r>
-                        <a:rPr lang="pt-BR" dirty="0">
-                          <a:latin typeface="Fira Sans" panose="020B0503050000020004" pitchFamily="34" charset="0"/>
-                        </a:rPr>
-                        <a:t>)</a:t>
+                        <a:t> 3)</a:t>
                       </a:r>
                     </a:p>
                   </a:txBody>
@@ -5025,7 +6572,7 @@
             <a:fld id="{8EFE941A-E170-432C-9C6F-1589B8418E42}" type="datetime1">
               <a:rPr lang="pt-BR" smtClean="0"/>
               <a:pPr/>
-              <a:t>16/08/2021</a:t>
+              <a:t>18/08/2021</a:t>
             </a:fld>
             <a:endParaRPr lang="pt-BR" dirty="0"/>
           </a:p>
@@ -5085,7 +6632,10 @@
               <a:pPr/>
               <a:t>6</a:t>
             </a:fld>
-            <a:endParaRPr lang="pt-BR"/>
+            <a:r>
+              <a:rPr lang="pt-BR" dirty="0"/>
+              <a:t>/9</a:t>
+            </a:r>
           </a:p>
         </p:txBody>
       </p:sp>
@@ -5134,7 +6684,15 @@
             </a:r>
             <a:r>
               <a:rPr lang="pt-BR" sz="3600" dirty="0"/>
-              <a:t> experimente design</a:t>
+              <a:t> </a:t>
+            </a:r>
+            <a:r>
+              <a:rPr lang="pt-BR" sz="3600" dirty="0" err="1"/>
+              <a:t>experiment</a:t>
+            </a:r>
+            <a:r>
+              <a:rPr lang="pt-BR" sz="3600" dirty="0"/>
+              <a:t> design</a:t>
             </a:r>
           </a:p>
         </p:txBody>
@@ -5190,7 +6748,7 @@
             </a:r>
             <a:r>
               <a:rPr lang="pt-BR" dirty="0" err="1"/>
-              <a:t>considered</a:t>
+              <a:t>used</a:t>
             </a:r>
             <a:r>
               <a:rPr lang="pt-BR" dirty="0"/>
@@ -5410,7 +6968,7 @@
             <a:fld id="{8EFE941A-E170-432C-9C6F-1589B8418E42}" type="datetime1">
               <a:rPr lang="pt-BR" smtClean="0"/>
               <a:pPr/>
-              <a:t>16/08/2021</a:t>
+              <a:t>18/08/2021</a:t>
             </a:fld>
             <a:endParaRPr lang="pt-BR" dirty="0"/>
           </a:p>
@@ -5470,7 +7028,10 @@
               <a:pPr/>
               <a:t>7</a:t>
             </a:fld>
-            <a:endParaRPr lang="pt-BR"/>
+            <a:r>
+              <a:rPr lang="pt-BR" dirty="0"/>
+              <a:t>/9</a:t>
+            </a:r>
           </a:p>
         </p:txBody>
       </p:sp>
@@ -5546,7 +7107,7 @@
             </a:r>
             <a:r>
               <a:rPr lang="en-US" b="1" dirty="0"/>
-              <a:t>Picked Champions and Players Statistics Dataset</a:t>
+              <a:t>Players Statistics Dataset</a:t>
             </a:r>
             <a:r>
               <a:rPr lang="en-US" dirty="0"/>
@@ -5701,7 +7262,7 @@
             <a:fld id="{8EFE941A-E170-432C-9C6F-1589B8418E42}" type="datetime1">
               <a:rPr lang="pt-BR" smtClean="0"/>
               <a:pPr/>
-              <a:t>16/08/2021</a:t>
+              <a:t>18/08/2021</a:t>
             </a:fld>
             <a:endParaRPr lang="pt-BR" dirty="0"/>
           </a:p>
@@ -5761,7 +7322,10 @@
               <a:pPr/>
               <a:t>8</a:t>
             </a:fld>
-            <a:endParaRPr lang="pt-BR"/>
+            <a:r>
+              <a:rPr lang="pt-BR" dirty="0"/>
+              <a:t>/9</a:t>
+            </a:r>
           </a:p>
         </p:txBody>
       </p:sp>
@@ -5819,7 +7383,7 @@
           </p:nvPr>
         </p:nvPicPr>
         <p:blipFill>
-          <a:blip r:embed="rId2">
+          <a:blip r:embed="rId3">
             <a:extLst>
               <a:ext uri="{28A0092B-C50C-407E-A947-70E740481C1C}">
                 <a14:useLocalDpi xmlns:a14="http://schemas.microsoft.com/office/drawing/2010/main" val="0"/>
@@ -5904,7 +7468,7 @@
             <a:fld id="{8EFE941A-E170-432C-9C6F-1589B8418E42}" type="datetime1">
               <a:rPr lang="pt-BR" smtClean="0"/>
               <a:pPr/>
-              <a:t>16/08/2021</a:t>
+              <a:t>18/08/2021</a:t>
             </a:fld>
             <a:endParaRPr lang="pt-BR" dirty="0"/>
           </a:p>
@@ -5964,7 +7528,10 @@
               <a:pPr/>
               <a:t>9</a:t>
             </a:fld>
-            <a:endParaRPr lang="pt-BR"/>
+            <a:r>
+              <a:rPr lang="pt-BR" dirty="0"/>
+              <a:t>/9</a:t>
+            </a:r>
           </a:p>
         </p:txBody>
       </p:sp>
@@ -6084,7 +7651,7 @@
           <a:p>
             <a:r>
               <a:rPr lang="en-US" dirty="0"/>
-              <a:t>In our future research we intend to concentrate on using the same features on different games like DOTA 2.</a:t>
+              <a:t>In our future research we intend to concentrate on using the similar features on different games like DOTA 2.</a:t>
             </a:r>
           </a:p>
         </p:txBody>

</xml_diff>